<commit_message>
cleaning up code for repo
check in before removing duplicate eda code in week 4
</commit_message>
<xml_diff>
--- a/Course_4_Unsupervised_Learning/Classification_Project_Body_Fat_Prediction.pptx
+++ b/Course_4_Unsupervised_Learning/Classification_Project_Body_Fat_Prediction.pptx
@@ -277,7 +277,7 @@
           <a:p>
             <a:fld id="{16F770BB-1FD8-45C5-AB6D-C1CFB5A40374}" type="datetimeFigureOut">
               <a:rPr lang="en-US" smtClean="0"/>
-              <a:t>8/6/2022</a:t>
+              <a:t>12/28/2022</a:t>
             </a:fld>
             <a:endParaRPr lang="en-US"/>
           </a:p>
@@ -475,7 +475,7 @@
           <a:p>
             <a:fld id="{16F770BB-1FD8-45C5-AB6D-C1CFB5A40374}" type="datetimeFigureOut">
               <a:rPr lang="en-US" smtClean="0"/>
-              <a:t>8/6/2022</a:t>
+              <a:t>12/28/2022</a:t>
             </a:fld>
             <a:endParaRPr lang="en-US"/>
           </a:p>
@@ -683,7 +683,7 @@
           <a:p>
             <a:fld id="{16F770BB-1FD8-45C5-AB6D-C1CFB5A40374}" type="datetimeFigureOut">
               <a:rPr lang="en-US" smtClean="0"/>
-              <a:t>8/6/2022</a:t>
+              <a:t>12/28/2022</a:t>
             </a:fld>
             <a:endParaRPr lang="en-US"/>
           </a:p>
@@ -881,7 +881,7 @@
           <a:p>
             <a:fld id="{16F770BB-1FD8-45C5-AB6D-C1CFB5A40374}" type="datetimeFigureOut">
               <a:rPr lang="en-US" smtClean="0"/>
-              <a:t>8/6/2022</a:t>
+              <a:t>12/28/2022</a:t>
             </a:fld>
             <a:endParaRPr lang="en-US"/>
           </a:p>
@@ -1156,7 +1156,7 @@
           <a:p>
             <a:fld id="{16F770BB-1FD8-45C5-AB6D-C1CFB5A40374}" type="datetimeFigureOut">
               <a:rPr lang="en-US" smtClean="0"/>
-              <a:t>8/6/2022</a:t>
+              <a:t>12/28/2022</a:t>
             </a:fld>
             <a:endParaRPr lang="en-US"/>
           </a:p>
@@ -1421,7 +1421,7 @@
           <a:p>
             <a:fld id="{16F770BB-1FD8-45C5-AB6D-C1CFB5A40374}" type="datetimeFigureOut">
               <a:rPr lang="en-US" smtClean="0"/>
-              <a:t>8/6/2022</a:t>
+              <a:t>12/28/2022</a:t>
             </a:fld>
             <a:endParaRPr lang="en-US"/>
           </a:p>
@@ -1833,7 +1833,7 @@
           <a:p>
             <a:fld id="{16F770BB-1FD8-45C5-AB6D-C1CFB5A40374}" type="datetimeFigureOut">
               <a:rPr lang="en-US" smtClean="0"/>
-              <a:t>8/6/2022</a:t>
+              <a:t>12/28/2022</a:t>
             </a:fld>
             <a:endParaRPr lang="en-US"/>
           </a:p>
@@ -1974,7 +1974,7 @@
           <a:p>
             <a:fld id="{16F770BB-1FD8-45C5-AB6D-C1CFB5A40374}" type="datetimeFigureOut">
               <a:rPr lang="en-US" smtClean="0"/>
-              <a:t>8/6/2022</a:t>
+              <a:t>12/28/2022</a:t>
             </a:fld>
             <a:endParaRPr lang="en-US"/>
           </a:p>
@@ -2087,7 +2087,7 @@
           <a:p>
             <a:fld id="{16F770BB-1FD8-45C5-AB6D-C1CFB5A40374}" type="datetimeFigureOut">
               <a:rPr lang="en-US" smtClean="0"/>
-              <a:t>8/6/2022</a:t>
+              <a:t>12/28/2022</a:t>
             </a:fld>
             <a:endParaRPr lang="en-US"/>
           </a:p>
@@ -2398,7 +2398,7 @@
           <a:p>
             <a:fld id="{16F770BB-1FD8-45C5-AB6D-C1CFB5A40374}" type="datetimeFigureOut">
               <a:rPr lang="en-US" smtClean="0"/>
-              <a:t>8/6/2022</a:t>
+              <a:t>12/28/2022</a:t>
             </a:fld>
             <a:endParaRPr lang="en-US"/>
           </a:p>
@@ -2686,7 +2686,7 @@
           <a:p>
             <a:fld id="{16F770BB-1FD8-45C5-AB6D-C1CFB5A40374}" type="datetimeFigureOut">
               <a:rPr lang="en-US" smtClean="0"/>
-              <a:t>8/6/2022</a:t>
+              <a:t>12/28/2022</a:t>
             </a:fld>
             <a:endParaRPr lang="en-US"/>
           </a:p>
@@ -2927,7 +2927,7 @@
           <a:p>
             <a:fld id="{16F770BB-1FD8-45C5-AB6D-C1CFB5A40374}" type="datetimeFigureOut">
               <a:rPr lang="en-US" smtClean="0"/>
-              <a:t>8/6/2022</a:t>
+              <a:t>12/28/2022</a:t>
             </a:fld>
             <a:endParaRPr lang="en-US"/>
           </a:p>
@@ -3393,7 +3393,7 @@
           <a:bodyPr/>
           <a:lstStyle/>
           <a:p>
-            <a:endParaRPr lang="en-US"/>
+            <a:endParaRPr lang="en-US" dirty="0"/>
           </a:p>
         </p:txBody>
       </p:sp>

</xml_diff>